<commit_message>
API Gateway document updated
</commit_message>
<xml_diff>
--- a/designDocuments/API-Gateway.pptx
+++ b/designDocuments/API-Gateway.pptx
@@ -9,10 +9,12 @@
   <p:sldIdLst>
     <p:sldId id="256" r:id="rId4"/>
     <p:sldId id="257" r:id="rId5"/>
-    <p:sldId id="259" r:id="rId6"/>
-    <p:sldId id="260" r:id="rId7"/>
-    <p:sldId id="258" r:id="rId8"/>
-    <p:sldId id="261" r:id="rId9"/>
+    <p:sldId id="262" r:id="rId6"/>
+    <p:sldId id="259" r:id="rId7"/>
+    <p:sldId id="260" r:id="rId8"/>
+    <p:sldId id="258" r:id="rId9"/>
+    <p:sldId id="263" r:id="rId10"/>
+    <p:sldId id="261" r:id="rId11"/>
   </p:sldIdLst>
   <p:sldSz cx="12192000" cy="6858000"/>
   <p:notesSz cx="6858000" cy="9144000"/>
@@ -564,7 +566,7 @@
           <a:p>
             <a:fld id="{13E4E708-AF17-4F5E-9A8F-E6717DDBAC35}" type="datetimeFigureOut">
               <a:rPr lang="en-IN" smtClean="0"/>
-              <a:t>08-04-2023</a:t>
+              <a:t>30-04-2023</a:t>
             </a:fld>
             <a:endParaRPr lang="en-IN"/>
           </a:p>
@@ -764,7 +766,7 @@
           <a:p>
             <a:fld id="{13E4E708-AF17-4F5E-9A8F-E6717DDBAC35}" type="datetimeFigureOut">
               <a:rPr lang="en-IN" smtClean="0"/>
-              <a:t>08-04-2023</a:t>
+              <a:t>30-04-2023</a:t>
             </a:fld>
             <a:endParaRPr lang="en-IN"/>
           </a:p>
@@ -974,7 +976,7 @@
           <a:p>
             <a:fld id="{13E4E708-AF17-4F5E-9A8F-E6717DDBAC35}" type="datetimeFigureOut">
               <a:rPr lang="en-IN" smtClean="0"/>
-              <a:t>08-04-2023</a:t>
+              <a:t>30-04-2023</a:t>
             </a:fld>
             <a:endParaRPr lang="en-IN"/>
           </a:p>
@@ -1223,7 +1225,7 @@
           <a:p>
             <a:fld id="{13E4E708-AF17-4F5E-9A8F-E6717DDBAC35}" type="datetimeFigureOut">
               <a:rPr lang="en-IN" smtClean="0"/>
-              <a:t>08-04-2023</a:t>
+              <a:t>30-04-2023</a:t>
             </a:fld>
             <a:endParaRPr lang="en-IN"/>
           </a:p>
@@ -1393,7 +1395,7 @@
           <a:p>
             <a:fld id="{13E4E708-AF17-4F5E-9A8F-E6717DDBAC35}" type="datetimeFigureOut">
               <a:rPr lang="en-IN" smtClean="0"/>
-              <a:t>08-04-2023</a:t>
+              <a:t>30-04-2023</a:t>
             </a:fld>
             <a:endParaRPr lang="en-IN"/>
           </a:p>
@@ -1699,7 +1701,7 @@
           <a:p>
             <a:fld id="{13E4E708-AF17-4F5E-9A8F-E6717DDBAC35}" type="datetimeFigureOut">
               <a:rPr lang="en-IN" smtClean="0"/>
-              <a:t>08-04-2023</a:t>
+              <a:t>30-04-2023</a:t>
             </a:fld>
             <a:endParaRPr lang="en-IN"/>
           </a:p>
@@ -2003,7 +2005,7 @@
           <a:p>
             <a:fld id="{13E4E708-AF17-4F5E-9A8F-E6717DDBAC35}" type="datetimeFigureOut">
               <a:rPr lang="en-IN" smtClean="0"/>
-              <a:t>08-04-2023</a:t>
+              <a:t>30-04-2023</a:t>
             </a:fld>
             <a:endParaRPr lang="en-IN"/>
           </a:p>
@@ -2425,7 +2427,7 @@
           <a:p>
             <a:fld id="{13E4E708-AF17-4F5E-9A8F-E6717DDBAC35}" type="datetimeFigureOut">
               <a:rPr lang="en-IN" smtClean="0"/>
-              <a:t>08-04-2023</a:t>
+              <a:t>30-04-2023</a:t>
             </a:fld>
             <a:endParaRPr lang="en-IN"/>
           </a:p>
@@ -2543,7 +2545,7 @@
           <a:p>
             <a:fld id="{13E4E708-AF17-4F5E-9A8F-E6717DDBAC35}" type="datetimeFigureOut">
               <a:rPr lang="en-IN" smtClean="0"/>
-              <a:t>08-04-2023</a:t>
+              <a:t>30-04-2023</a:t>
             </a:fld>
             <a:endParaRPr lang="en-IN"/>
           </a:p>
@@ -2638,7 +2640,7 @@
           <a:p>
             <a:fld id="{13E4E708-AF17-4F5E-9A8F-E6717DDBAC35}" type="datetimeFigureOut">
               <a:rPr lang="en-IN" smtClean="0"/>
-              <a:t>08-04-2023</a:t>
+              <a:t>30-04-2023</a:t>
             </a:fld>
             <a:endParaRPr lang="en-IN"/>
           </a:p>
@@ -2911,7 +2913,7 @@
           <a:p>
             <a:fld id="{13E4E708-AF17-4F5E-9A8F-E6717DDBAC35}" type="datetimeFigureOut">
               <a:rPr lang="en-IN" smtClean="0"/>
-              <a:t>08-04-2023</a:t>
+              <a:t>30-04-2023</a:t>
             </a:fld>
             <a:endParaRPr lang="en-IN"/>
           </a:p>
@@ -3099,7 +3101,7 @@
           <a:p>
             <a:fld id="{13E4E708-AF17-4F5E-9A8F-E6717DDBAC35}" type="datetimeFigureOut">
               <a:rPr lang="en-IN" smtClean="0"/>
-              <a:t>08-04-2023</a:t>
+              <a:t>30-04-2023</a:t>
             </a:fld>
             <a:endParaRPr lang="en-IN"/>
           </a:p>
@@ -3376,7 +3378,7 @@
           <a:p>
             <a:fld id="{13E4E708-AF17-4F5E-9A8F-E6717DDBAC35}" type="datetimeFigureOut">
               <a:rPr lang="en-IN" smtClean="0"/>
-              <a:t>08-04-2023</a:t>
+              <a:t>30-04-2023</a:t>
             </a:fld>
             <a:endParaRPr lang="en-IN"/>
           </a:p>
@@ -3546,7 +3548,7 @@
           <a:p>
             <a:fld id="{13E4E708-AF17-4F5E-9A8F-E6717DDBAC35}" type="datetimeFigureOut">
               <a:rPr lang="en-IN" smtClean="0"/>
-              <a:t>08-04-2023</a:t>
+              <a:t>30-04-2023</a:t>
             </a:fld>
             <a:endParaRPr lang="en-IN"/>
           </a:p>
@@ -3769,7 +3771,7 @@
           <a:p>
             <a:fld id="{13E4E708-AF17-4F5E-9A8F-E6717DDBAC35}" type="datetimeFigureOut">
               <a:rPr lang="en-IN" smtClean="0"/>
-              <a:t>08-04-2023</a:t>
+              <a:t>30-04-2023</a:t>
             </a:fld>
             <a:endParaRPr lang="en-IN"/>
           </a:p>
@@ -4302,7 +4304,7 @@
           <a:p>
             <a:fld id="{13E4E708-AF17-4F5E-9A8F-E6717DDBAC35}" type="datetimeFigureOut">
               <a:rPr lang="en-IN" smtClean="0"/>
-              <a:t>08-04-2023</a:t>
+              <a:t>30-04-2023</a:t>
             </a:fld>
             <a:endParaRPr lang="en-IN"/>
           </a:p>
@@ -4504,7 +4506,7 @@
           <a:p>
             <a:fld id="{13E4E708-AF17-4F5E-9A8F-E6717DDBAC35}" type="datetimeFigureOut">
               <a:rPr lang="en-IN" smtClean="0"/>
-              <a:t>08-04-2023</a:t>
+              <a:t>30-04-2023</a:t>
             </a:fld>
             <a:endParaRPr lang="en-IN"/>
           </a:p>
@@ -5075,7 +5077,7 @@
           <a:p>
             <a:fld id="{13E4E708-AF17-4F5E-9A8F-E6717DDBAC35}" type="datetimeFigureOut">
               <a:rPr lang="en-IN" smtClean="0"/>
-              <a:t>08-04-2023</a:t>
+              <a:t>30-04-2023</a:t>
             </a:fld>
             <a:endParaRPr lang="en-IN"/>
           </a:p>
@@ -5377,7 +5379,7 @@
           <a:p>
             <a:fld id="{13E4E708-AF17-4F5E-9A8F-E6717DDBAC35}" type="datetimeFigureOut">
               <a:rPr lang="en-IN" smtClean="0"/>
-              <a:t>08-04-2023</a:t>
+              <a:t>30-04-2023</a:t>
             </a:fld>
             <a:endParaRPr lang="en-IN"/>
           </a:p>
@@ -5814,7 +5816,7 @@
           <a:p>
             <a:fld id="{13E4E708-AF17-4F5E-9A8F-E6717DDBAC35}" type="datetimeFigureOut">
               <a:rPr lang="en-IN" smtClean="0"/>
-              <a:t>08-04-2023</a:t>
+              <a:t>30-04-2023</a:t>
             </a:fld>
             <a:endParaRPr lang="en-IN"/>
           </a:p>
@@ -5932,7 +5934,7 @@
           <a:p>
             <a:fld id="{13E4E708-AF17-4F5E-9A8F-E6717DDBAC35}" type="datetimeFigureOut">
               <a:rPr lang="en-IN" smtClean="0"/>
-              <a:t>08-04-2023</a:t>
+              <a:t>30-04-2023</a:t>
             </a:fld>
             <a:endParaRPr lang="en-IN"/>
           </a:p>
@@ -6027,7 +6029,7 @@
           <a:p>
             <a:fld id="{13E4E708-AF17-4F5E-9A8F-E6717DDBAC35}" type="datetimeFigureOut">
               <a:rPr lang="en-IN" smtClean="0"/>
-              <a:t>08-04-2023</a:t>
+              <a:t>30-04-2023</a:t>
             </a:fld>
             <a:endParaRPr lang="en-IN"/>
           </a:p>
@@ -6291,7 +6293,7 @@
           <a:p>
             <a:fld id="{13E4E708-AF17-4F5E-9A8F-E6717DDBAC35}" type="datetimeFigureOut">
               <a:rPr lang="en-IN" smtClean="0"/>
-              <a:t>08-04-2023</a:t>
+              <a:t>30-04-2023</a:t>
             </a:fld>
             <a:endParaRPr lang="en-IN"/>
           </a:p>
@@ -6685,7 +6687,7 @@
           <a:p>
             <a:fld id="{13E4E708-AF17-4F5E-9A8F-E6717DDBAC35}" type="datetimeFigureOut">
               <a:rPr lang="en-IN" smtClean="0"/>
-              <a:t>08-04-2023</a:t>
+              <a:t>30-04-2023</a:t>
             </a:fld>
             <a:endParaRPr lang="en-IN"/>
           </a:p>
@@ -7079,7 +7081,7 @@
           <a:p>
             <a:fld id="{13E4E708-AF17-4F5E-9A8F-E6717DDBAC35}" type="datetimeFigureOut">
               <a:rPr lang="en-IN" smtClean="0"/>
-              <a:t>08-04-2023</a:t>
+              <a:t>30-04-2023</a:t>
             </a:fld>
             <a:endParaRPr lang="en-IN"/>
           </a:p>
@@ -7319,7 +7321,7 @@
           <a:p>
             <a:fld id="{13E4E708-AF17-4F5E-9A8F-E6717DDBAC35}" type="datetimeFigureOut">
               <a:rPr lang="en-IN" smtClean="0"/>
-              <a:t>08-04-2023</a:t>
+              <a:t>30-04-2023</a:t>
             </a:fld>
             <a:endParaRPr lang="en-IN"/>
           </a:p>
@@ -7499,7 +7501,7 @@
           <a:p>
             <a:fld id="{13E4E708-AF17-4F5E-9A8F-E6717DDBAC35}" type="datetimeFigureOut">
               <a:rPr lang="en-IN" smtClean="0"/>
-              <a:t>08-04-2023</a:t>
+              <a:t>30-04-2023</a:t>
             </a:fld>
             <a:endParaRPr lang="en-IN"/>
           </a:p>
@@ -7755,7 +7757,7 @@
           <a:p>
             <a:fld id="{13E4E708-AF17-4F5E-9A8F-E6717DDBAC35}" type="datetimeFigureOut">
               <a:rPr lang="en-IN" smtClean="0"/>
-              <a:t>08-04-2023</a:t>
+              <a:t>30-04-2023</a:t>
             </a:fld>
             <a:endParaRPr lang="en-IN"/>
           </a:p>
@@ -8170,7 +8172,7 @@
           <a:p>
             <a:fld id="{13E4E708-AF17-4F5E-9A8F-E6717DDBAC35}" type="datetimeFigureOut">
               <a:rPr lang="en-IN" smtClean="0"/>
-              <a:t>08-04-2023</a:t>
+              <a:t>30-04-2023</a:t>
             </a:fld>
             <a:endParaRPr lang="en-IN"/>
           </a:p>
@@ -8312,7 +8314,7 @@
           <a:p>
             <a:fld id="{13E4E708-AF17-4F5E-9A8F-E6717DDBAC35}" type="datetimeFigureOut">
               <a:rPr lang="en-IN" smtClean="0"/>
-              <a:t>08-04-2023</a:t>
+              <a:t>30-04-2023</a:t>
             </a:fld>
             <a:endParaRPr lang="en-IN"/>
           </a:p>
@@ -8425,7 +8427,7 @@
           <a:p>
             <a:fld id="{13E4E708-AF17-4F5E-9A8F-E6717DDBAC35}" type="datetimeFigureOut">
               <a:rPr lang="en-IN" smtClean="0"/>
-              <a:t>08-04-2023</a:t>
+              <a:t>30-04-2023</a:t>
             </a:fld>
             <a:endParaRPr lang="en-IN"/>
           </a:p>
@@ -8738,7 +8740,7 @@
           <a:p>
             <a:fld id="{13E4E708-AF17-4F5E-9A8F-E6717DDBAC35}" type="datetimeFigureOut">
               <a:rPr lang="en-IN" smtClean="0"/>
-              <a:t>08-04-2023</a:t>
+              <a:t>30-04-2023</a:t>
             </a:fld>
             <a:endParaRPr lang="en-IN"/>
           </a:p>
@@ -9027,7 +9029,7 @@
           <a:p>
             <a:fld id="{13E4E708-AF17-4F5E-9A8F-E6717DDBAC35}" type="datetimeFigureOut">
               <a:rPr lang="en-IN" smtClean="0"/>
-              <a:t>08-04-2023</a:t>
+              <a:t>30-04-2023</a:t>
             </a:fld>
             <a:endParaRPr lang="en-IN"/>
           </a:p>
@@ -9270,7 +9272,7 @@
           <a:p>
             <a:fld id="{13E4E708-AF17-4F5E-9A8F-E6717DDBAC35}" type="datetimeFigureOut">
               <a:rPr lang="en-IN" smtClean="0"/>
-              <a:t>08-04-2023</a:t>
+              <a:t>30-04-2023</a:t>
             </a:fld>
             <a:endParaRPr lang="en-IN"/>
           </a:p>
@@ -9858,7 +9860,7 @@
           <a:p>
             <a:fld id="{13E4E708-AF17-4F5E-9A8F-E6717DDBAC35}" type="datetimeFigureOut">
               <a:rPr lang="en-IN" smtClean="0"/>
-              <a:t>08-04-2023</a:t>
+              <a:t>30-04-2023</a:t>
             </a:fld>
             <a:endParaRPr lang="en-IN"/>
           </a:p>
@@ -10478,7 +10480,7 @@
           <a:p>
             <a:fld id="{13E4E708-AF17-4F5E-9A8F-E6717DDBAC35}" type="datetimeFigureOut">
               <a:rPr lang="en-IN" smtClean="0"/>
-              <a:t>08-04-2023</a:t>
+              <a:t>30-04-2023</a:t>
             </a:fld>
             <a:endParaRPr lang="en-IN"/>
           </a:p>
@@ -11364,6 +11366,178 @@
           <a:chExt cx="0" cy="0"/>
         </a:xfrm>
       </p:grpSpPr>
+      <p:sp>
+        <p:nvSpPr>
+          <p:cNvPr id="5" name="Title 4">
+            <a:extLst>
+              <a:ext uri="{FF2B5EF4-FFF2-40B4-BE49-F238E27FC236}">
+                <a16:creationId xmlns:a16="http://schemas.microsoft.com/office/drawing/2014/main" id="{2E0C95A4-8C05-0E3A-C3FA-E6A9AB8362BC}"/>
+              </a:ext>
+            </a:extLst>
+          </p:cNvPr>
+          <p:cNvSpPr>
+            <a:spLocks noGrp="1"/>
+          </p:cNvSpPr>
+          <p:nvPr>
+            <p:ph type="title"/>
+          </p:nvPr>
+        </p:nvSpPr>
+        <p:spPr>
+          <a:xfrm>
+            <a:off x="355602" y="982134"/>
+            <a:ext cx="4416423" cy="660400"/>
+          </a:xfrm>
+        </p:spPr>
+        <p:txBody>
+          <a:bodyPr>
+            <a:normAutofit fontScale="90000"/>
+          </a:bodyPr>
+          <a:lstStyle/>
+          <a:p>
+            <a:r>
+              <a:rPr lang="en-US" sz="3200" b="0" i="0" dirty="0">
+                <a:solidFill>
+                  <a:srgbClr val="0070C0"/>
+                </a:solidFill>
+                <a:effectLst/>
+                <a:latin typeface="inter-regular"/>
+              </a:rPr>
+              <a:t>The API Gateway is a Server</a:t>
+            </a:r>
+            <a:endParaRPr lang="en-IN" dirty="0">
+              <a:solidFill>
+                <a:srgbClr val="0070C0"/>
+              </a:solidFill>
+            </a:endParaRPr>
+          </a:p>
+        </p:txBody>
+      </p:sp>
+      <p:pic>
+        <p:nvPicPr>
+          <p:cNvPr id="9" name="Picture 2">
+            <a:extLst>
+              <a:ext uri="{FF2B5EF4-FFF2-40B4-BE49-F238E27FC236}">
+                <a16:creationId xmlns:a16="http://schemas.microsoft.com/office/drawing/2014/main" id="{F75F9817-0948-3863-A486-36AF16E0D5B2}"/>
+              </a:ext>
+            </a:extLst>
+          </p:cNvPr>
+          <p:cNvPicPr>
+            <a:picLocks noChangeAspect="1" noChangeArrowheads="1"/>
+          </p:cNvPicPr>
+          <p:nvPr/>
+        </p:nvPicPr>
+        <p:blipFill>
+          <a:blip r:embed="rId2">
+            <a:extLst>
+              <a:ext uri="{28A0092B-C50C-407E-A947-70E740481C1C}">
+                <a14:useLocalDpi xmlns:a14="http://schemas.microsoft.com/office/drawing/2010/main" val="0"/>
+              </a:ext>
+            </a:extLst>
+          </a:blip>
+          <a:srcRect/>
+          <a:stretch>
+            <a:fillRect/>
+          </a:stretch>
+        </p:blipFill>
+        <p:spPr bwMode="auto">
+          <a:xfrm>
+            <a:off x="5088465" y="1117600"/>
+            <a:ext cx="6747933" cy="4758266"/>
+          </a:xfrm>
+          <a:prstGeom prst="rect">
+            <a:avLst/>
+          </a:prstGeom>
+          <a:noFill/>
+          <a:extLst>
+            <a:ext uri="{909E8E84-426E-40DD-AFC4-6F175D3DCCD1}">
+              <a14:hiddenFill xmlns:a14="http://schemas.microsoft.com/office/drawing/2010/main">
+                <a:solidFill>
+                  <a:srgbClr val="FFFFFF"/>
+                </a:solidFill>
+              </a14:hiddenFill>
+            </a:ext>
+          </a:extLst>
+        </p:spPr>
+      </p:pic>
+      <p:pic>
+        <p:nvPicPr>
+          <p:cNvPr id="10" name="Picture 2" descr="Introduction to API Gateways">
+            <a:extLst>
+              <a:ext uri="{FF2B5EF4-FFF2-40B4-BE49-F238E27FC236}">
+                <a16:creationId xmlns:a16="http://schemas.microsoft.com/office/drawing/2014/main" id="{CDB4605F-1CC4-879A-C97D-95E84FDFDC26}"/>
+              </a:ext>
+            </a:extLst>
+          </p:cNvPr>
+          <p:cNvPicPr>
+            <a:picLocks noGrp="1" noChangeAspect="1" noChangeArrowheads="1"/>
+          </p:cNvPicPr>
+          <p:nvPr>
+            <p:ph sz="half" idx="1"/>
+          </p:nvPr>
+        </p:nvPicPr>
+        <p:blipFill>
+          <a:blip r:embed="rId3">
+            <a:extLst>
+              <a:ext uri="{28A0092B-C50C-407E-A947-70E740481C1C}">
+                <a14:useLocalDpi xmlns:a14="http://schemas.microsoft.com/office/drawing/2010/main" val="0"/>
+              </a:ext>
+            </a:extLst>
+          </a:blip>
+          <a:srcRect/>
+          <a:stretch>
+            <a:fillRect/>
+          </a:stretch>
+        </p:blipFill>
+        <p:spPr bwMode="auto">
+          <a:xfrm>
+            <a:off x="260350" y="2065866"/>
+            <a:ext cx="4762500" cy="3810000"/>
+          </a:xfrm>
+          <a:prstGeom prst="rect">
+            <a:avLst/>
+          </a:prstGeom>
+          <a:noFill/>
+          <a:extLst>
+            <a:ext uri="{909E8E84-426E-40DD-AFC4-6F175D3DCCD1}">
+              <a14:hiddenFill xmlns:a14="http://schemas.microsoft.com/office/drawing/2010/main">
+                <a:solidFill>
+                  <a:srgbClr val="FFFFFF"/>
+                </a:solidFill>
+              </a14:hiddenFill>
+            </a:ext>
+          </a:extLst>
+        </p:spPr>
+      </p:pic>
+    </p:spTree>
+    <p:extLst>
+      <p:ext uri="{BB962C8B-B14F-4D97-AF65-F5344CB8AC3E}">
+        <p14:creationId xmlns:p14="http://schemas.microsoft.com/office/powerpoint/2010/main" val="1696907551"/>
+      </p:ext>
+    </p:extLst>
+  </p:cSld>
+  <p:clrMapOvr>
+    <a:masterClrMapping/>
+  </p:clrMapOvr>
+</p:sld>
+</file>
+
+<file path=ppt/slides/slide4.xml><?xml version="1.0" encoding="utf-8"?>
+<p:sld xmlns:a="http://schemas.openxmlformats.org/drawingml/2006/main" xmlns:r="http://schemas.openxmlformats.org/officeDocument/2006/relationships" xmlns:p="http://schemas.openxmlformats.org/presentationml/2006/main">
+  <p:cSld>
+    <p:spTree>
+      <p:nvGrpSpPr>
+        <p:cNvPr id="1" name=""/>
+        <p:cNvGrpSpPr/>
+        <p:nvPr/>
+      </p:nvGrpSpPr>
+      <p:grpSpPr>
+        <a:xfrm>
+          <a:off x="0" y="0"/>
+          <a:ext cx="0" cy="0"/>
+          <a:chOff x="0" y="0"/>
+          <a:chExt cx="0" cy="0"/>
+        </a:xfrm>
+      </p:grpSpPr>
       <p:pic>
         <p:nvPicPr>
           <p:cNvPr id="2050" name="Picture 2">
@@ -11644,7 +11818,7 @@
 </p:sld>
 </file>
 
-<file path=ppt/slides/slide4.xml><?xml version="1.0" encoding="utf-8"?>
+<file path=ppt/slides/slide5.xml><?xml version="1.0" encoding="utf-8"?>
 <p:sld xmlns:a="http://schemas.openxmlformats.org/drawingml/2006/main" xmlns:r="http://schemas.openxmlformats.org/officeDocument/2006/relationships" xmlns:p="http://schemas.openxmlformats.org/presentationml/2006/main">
   <p:cSld>
     <p:spTree>
@@ -12112,7 +12286,7 @@
 </p:sld>
 </file>
 
-<file path=ppt/slides/slide5.xml><?xml version="1.0" encoding="utf-8"?>
+<file path=ppt/slides/slide6.xml><?xml version="1.0" encoding="utf-8"?>
 <p:sld xmlns:a="http://schemas.openxmlformats.org/drawingml/2006/main" xmlns:r="http://schemas.openxmlformats.org/officeDocument/2006/relationships" xmlns:p="http://schemas.openxmlformats.org/presentationml/2006/main">
   <p:cSld>
     <p:spTree>
@@ -12287,7 +12461,107 @@
 </p:sld>
 </file>
 
-<file path=ppt/slides/slide6.xml><?xml version="1.0" encoding="utf-8"?>
+<file path=ppt/slides/slide7.xml><?xml version="1.0" encoding="utf-8"?>
+<p:sld xmlns:a="http://schemas.openxmlformats.org/drawingml/2006/main" xmlns:r="http://schemas.openxmlformats.org/officeDocument/2006/relationships" xmlns:p="http://schemas.openxmlformats.org/presentationml/2006/main">
+  <p:cSld>
+    <p:spTree>
+      <p:nvGrpSpPr>
+        <p:cNvPr id="1" name=""/>
+        <p:cNvGrpSpPr/>
+        <p:nvPr/>
+      </p:nvGrpSpPr>
+      <p:grpSpPr>
+        <a:xfrm>
+          <a:off x="0" y="0"/>
+          <a:ext cx="0" cy="0"/>
+          <a:chOff x="0" y="0"/>
+          <a:chExt cx="0" cy="0"/>
+        </a:xfrm>
+      </p:grpSpPr>
+      <p:sp>
+        <p:nvSpPr>
+          <p:cNvPr id="5" name="Title 4">
+            <a:extLst>
+              <a:ext uri="{FF2B5EF4-FFF2-40B4-BE49-F238E27FC236}">
+                <a16:creationId xmlns:a16="http://schemas.microsoft.com/office/drawing/2014/main" id="{9780E195-0BC2-B7E1-C808-1D93D0A1C2D7}"/>
+              </a:ext>
+            </a:extLst>
+          </p:cNvPr>
+          <p:cNvSpPr>
+            <a:spLocks noGrp="1"/>
+          </p:cNvSpPr>
+          <p:nvPr>
+            <p:ph type="title"/>
+          </p:nvPr>
+        </p:nvSpPr>
+        <p:spPr>
+          <a:xfrm>
+            <a:off x="389467" y="322793"/>
+            <a:ext cx="10515600" cy="837142"/>
+          </a:xfrm>
+        </p:spPr>
+        <p:txBody>
+          <a:bodyPr/>
+          <a:lstStyle/>
+          <a:p>
+            <a:r>
+              <a:rPr lang="en-US" dirty="0"/>
+              <a:t>API- Gateway FAQ</a:t>
+            </a:r>
+            <a:endParaRPr lang="en-IN" dirty="0"/>
+          </a:p>
+        </p:txBody>
+      </p:sp>
+      <p:sp>
+        <p:nvSpPr>
+          <p:cNvPr id="6" name="Content Placeholder 5">
+            <a:extLst>
+              <a:ext uri="{FF2B5EF4-FFF2-40B4-BE49-F238E27FC236}">
+                <a16:creationId xmlns:a16="http://schemas.microsoft.com/office/drawing/2014/main" id="{A938BC89-62CD-EDC9-B924-EA8A0C40468E}"/>
+              </a:ext>
+            </a:extLst>
+          </p:cNvPr>
+          <p:cNvSpPr>
+            <a:spLocks noGrp="1"/>
+          </p:cNvSpPr>
+          <p:nvPr>
+            <p:ph idx="1"/>
+          </p:nvPr>
+        </p:nvSpPr>
+        <p:spPr>
+          <a:xfrm>
+            <a:off x="389467" y="1405466"/>
+            <a:ext cx="11430000" cy="5062007"/>
+          </a:xfrm>
+        </p:spPr>
+        <p:txBody>
+          <a:bodyPr>
+            <a:normAutofit/>
+          </a:bodyPr>
+          <a:lstStyle/>
+          <a:p>
+            <a:r>
+              <a:rPr lang="en-US" sz="1800" dirty="0"/>
+              <a:t>API Gateway Drawback- Is it single point of failure?</a:t>
+            </a:r>
+            <a:endParaRPr lang="en-IN" sz="1800" dirty="0"/>
+          </a:p>
+        </p:txBody>
+      </p:sp>
+    </p:spTree>
+    <p:extLst>
+      <p:ext uri="{BB962C8B-B14F-4D97-AF65-F5344CB8AC3E}">
+        <p14:creationId xmlns:p14="http://schemas.microsoft.com/office/powerpoint/2010/main" val="3137382098"/>
+      </p:ext>
+    </p:extLst>
+  </p:cSld>
+  <p:clrMapOvr>
+    <a:masterClrMapping/>
+  </p:clrMapOvr>
+</p:sld>
+</file>
+
+<file path=ppt/slides/slide8.xml><?xml version="1.0" encoding="utf-8"?>
 <p:sld xmlns:a="http://schemas.openxmlformats.org/drawingml/2006/main" xmlns:r="http://schemas.openxmlformats.org/officeDocument/2006/relationships" xmlns:p="http://schemas.openxmlformats.org/presentationml/2006/main">
   <p:cSld>
     <p:spTree>

</xml_diff>